<commit_message>
Recitation #6 slides 10/5/18: Quiz review / LR
</commit_message>
<xml_diff>
--- a/cs1675_rec6_oct5.pptx
+++ b/cs1675_rec6_oct5.pptx
@@ -8233,10 +8233,13 @@
               <a:t> and </a:t>
             </a:r>
             <a:r>
-              <a:rPr lang="en-US" sz="2200"/>
-              <a:t>xTest.   </a:t>
-            </a:r>
-            <a:endParaRPr lang="en-US" sz="2200" dirty="0"/>
+              <a:rPr lang="en-US" sz="2200" dirty="0" err="1"/>
+              <a:t>xTest</a:t>
+            </a:r>
+            <a:r>
+              <a:rPr lang="en-US" sz="2200" dirty="0"/>
+              <a:t>.   </a:t>
+            </a:r>
           </a:p>
           <a:p>
             <a:pPr marL="342900" indent="-342900">

</xml_diff>